<commit_message>
feat: api get users
</commit_message>
<xml_diff>
--- a/readme/GUI.pptx
+++ b/readme/GUI.pptx
@@ -260,7 +260,7 @@
           <a:p>
             <a:fld id="{60A84C84-D1E1-4399-9841-730FF4DD4A34}" type="datetimeFigureOut">
               <a:rPr lang="es-ES" smtClean="0"/>
-              <a:t>15/10/2024</a:t>
+              <a:t>27/10/2024</a:t>
             </a:fld>
             <a:endParaRPr lang="es-ES"/>
           </a:p>
@@ -458,7 +458,7 @@
           <a:p>
             <a:fld id="{60A84C84-D1E1-4399-9841-730FF4DD4A34}" type="datetimeFigureOut">
               <a:rPr lang="es-ES" smtClean="0"/>
-              <a:t>15/10/2024</a:t>
+              <a:t>27/10/2024</a:t>
             </a:fld>
             <a:endParaRPr lang="es-ES"/>
           </a:p>
@@ -666,7 +666,7 @@
           <a:p>
             <a:fld id="{60A84C84-D1E1-4399-9841-730FF4DD4A34}" type="datetimeFigureOut">
               <a:rPr lang="es-ES" smtClean="0"/>
-              <a:t>15/10/2024</a:t>
+              <a:t>27/10/2024</a:t>
             </a:fld>
             <a:endParaRPr lang="es-ES"/>
           </a:p>
@@ -864,7 +864,7 @@
           <a:p>
             <a:fld id="{60A84C84-D1E1-4399-9841-730FF4DD4A34}" type="datetimeFigureOut">
               <a:rPr lang="es-ES" smtClean="0"/>
-              <a:t>15/10/2024</a:t>
+              <a:t>27/10/2024</a:t>
             </a:fld>
             <a:endParaRPr lang="es-ES"/>
           </a:p>
@@ -1139,7 +1139,7 @@
           <a:p>
             <a:fld id="{60A84C84-D1E1-4399-9841-730FF4DD4A34}" type="datetimeFigureOut">
               <a:rPr lang="es-ES" smtClean="0"/>
-              <a:t>15/10/2024</a:t>
+              <a:t>27/10/2024</a:t>
             </a:fld>
             <a:endParaRPr lang="es-ES"/>
           </a:p>
@@ -1404,7 +1404,7 @@
           <a:p>
             <a:fld id="{60A84C84-D1E1-4399-9841-730FF4DD4A34}" type="datetimeFigureOut">
               <a:rPr lang="es-ES" smtClean="0"/>
-              <a:t>15/10/2024</a:t>
+              <a:t>27/10/2024</a:t>
             </a:fld>
             <a:endParaRPr lang="es-ES"/>
           </a:p>
@@ -1816,7 +1816,7 @@
           <a:p>
             <a:fld id="{60A84C84-D1E1-4399-9841-730FF4DD4A34}" type="datetimeFigureOut">
               <a:rPr lang="es-ES" smtClean="0"/>
-              <a:t>15/10/2024</a:t>
+              <a:t>27/10/2024</a:t>
             </a:fld>
             <a:endParaRPr lang="es-ES"/>
           </a:p>
@@ -1957,7 +1957,7 @@
           <a:p>
             <a:fld id="{60A84C84-D1E1-4399-9841-730FF4DD4A34}" type="datetimeFigureOut">
               <a:rPr lang="es-ES" smtClean="0"/>
-              <a:t>15/10/2024</a:t>
+              <a:t>27/10/2024</a:t>
             </a:fld>
             <a:endParaRPr lang="es-ES"/>
           </a:p>
@@ -2070,7 +2070,7 @@
           <a:p>
             <a:fld id="{60A84C84-D1E1-4399-9841-730FF4DD4A34}" type="datetimeFigureOut">
               <a:rPr lang="es-ES" smtClean="0"/>
-              <a:t>15/10/2024</a:t>
+              <a:t>27/10/2024</a:t>
             </a:fld>
             <a:endParaRPr lang="es-ES"/>
           </a:p>
@@ -2381,7 +2381,7 @@
           <a:p>
             <a:fld id="{60A84C84-D1E1-4399-9841-730FF4DD4A34}" type="datetimeFigureOut">
               <a:rPr lang="es-ES" smtClean="0"/>
-              <a:t>15/10/2024</a:t>
+              <a:t>27/10/2024</a:t>
             </a:fld>
             <a:endParaRPr lang="es-ES"/>
           </a:p>
@@ -2669,7 +2669,7 @@
           <a:p>
             <a:fld id="{60A84C84-D1E1-4399-9841-730FF4DD4A34}" type="datetimeFigureOut">
               <a:rPr lang="es-ES" smtClean="0"/>
-              <a:t>15/10/2024</a:t>
+              <a:t>27/10/2024</a:t>
             </a:fld>
             <a:endParaRPr lang="es-ES"/>
           </a:p>
@@ -2910,7 +2910,7 @@
           <a:p>
             <a:fld id="{60A84C84-D1E1-4399-9841-730FF4DD4A34}" type="datetimeFigureOut">
               <a:rPr lang="es-ES" smtClean="0"/>
-              <a:t>15/10/2024</a:t>
+              <a:t>27/10/2024</a:t>
             </a:fld>
             <a:endParaRPr lang="es-ES"/>
           </a:p>
@@ -4811,6 +4811,9 @@
           <a:prstGeom prst="rect">
             <a:avLst/>
           </a:prstGeom>
+          <a:solidFill>
+            <a:schemeClr val="accent1"/>
+          </a:solidFill>
           <a:ln>
             <a:solidFill>
               <a:schemeClr val="tx1">
@@ -5278,7 +5281,7 @@
           <p:nvPr>
             <p:extLst>
               <p:ext uri="{D42A27DB-BD31-4B8C-83A1-F6EECF244321}">
-                <p14:modId xmlns:p14="http://schemas.microsoft.com/office/powerpoint/2010/main" val="131648443"/>
+                <p14:modId xmlns:p14="http://schemas.microsoft.com/office/powerpoint/2010/main" val="2575611216"/>
               </p:ext>
             </p:extLst>
           </p:nvPr>
@@ -5469,7 +5472,7 @@
                     <a:bodyPr/>
                     <a:lstStyle/>
                     <a:p>
-                      <a:pPr algn="ctr"/>
+                      <a:pPr algn="r"/>
                       <a:r>
                         <a:rPr lang="es-ES" b="1" u="sng" dirty="0"/>
                         <a:t>validar</a:t>

</xml_diff>